<commit_message>
Fix blurry arrows in AutoCompleteLogic Sequence Diagram
</commit_message>
<xml_diff>
--- a/docs/diagrams/AutoCompleteLogicComponentSequenceDiagram.pptx
+++ b/docs/diagrams/AutoCompleteLogicComponentSequenceDiagram.pptx
@@ -4167,7 +4167,7 @@
         <p:spPr>
           <a:xfrm>
             <a:off x="1670186" y="4248609"/>
-            <a:ext cx="1039565" cy="9581"/>
+            <a:ext cx="1067956" cy="0"/>
           </a:xfrm>
           <a:prstGeom prst="straightConnector1">
             <a:avLst/>
@@ -4329,7 +4329,7 @@
         </p:nvCxnSpPr>
         <p:spPr>
           <a:xfrm>
-            <a:off x="1653251" y="5486400"/>
+            <a:off x="1653251" y="5514717"/>
             <a:ext cx="1084891" cy="0"/>
           </a:xfrm>
           <a:prstGeom prst="straightConnector1">

</xml_diff>